<commit_message>
Add more content on recursion
</commit_message>
<xml_diff>
--- a/fundamentals/midway_quiz.pptx
+++ b/fundamentals/midway_quiz.pptx
@@ -26,8 +26,8 @@
     <p:sldId id="266" r:id="rId14"/>
     <p:sldId id="271" r:id="rId15"/>
     <p:sldId id="272" r:id="rId16"/>
-    <p:sldId id="258" r:id="rId17"/>
-    <p:sldId id="257" r:id="rId18"/>
+    <p:sldId id="273" r:id="rId17"/>
+    <p:sldId id="274" r:id="rId18"/>
   </p:sldIdLst>
   <p:sldSz cx="12192000" cy="6858000"/>
   <p:notesSz cx="6858000" cy="9144000"/>
@@ -231,7 +231,7 @@
           <a:p>
             <a:fld id="{93FF6AAF-F570-A54A-9984-FE9D8EB29214}" type="datetimeFigureOut">
               <a:rPr lang="en-US" smtClean="0"/>
-              <a:t>8/12/20</a:t>
+              <a:t>8/14/20</a:t>
             </a:fld>
             <a:endParaRPr lang="en-US"/>
           </a:p>
@@ -408,7 +408,7 @@
           <a:p>
             <a:fld id="{720C9186-47A3-C54A-A8AF-47B660C0099D}" type="datetimeFigureOut">
               <a:rPr lang="en-US" smtClean="0"/>
-              <a:t>8/12/20</a:t>
+              <a:t>8/14/20</a:t>
             </a:fld>
             <a:endParaRPr lang="en-US"/>
           </a:p>
@@ -825,7 +825,7 @@
           <a:p>
             <a:fld id="{819F1B0C-88C5-8743-A989-F2A2B2547689}" type="datetimeFigureOut">
               <a:rPr lang="en-US" smtClean="0"/>
-              <a:t>8/12/20</a:t>
+              <a:t>8/14/20</a:t>
             </a:fld>
             <a:endParaRPr lang="en-US"/>
           </a:p>
@@ -1025,7 +1025,7 @@
           <a:p>
             <a:fld id="{819F1B0C-88C5-8743-A989-F2A2B2547689}" type="datetimeFigureOut">
               <a:rPr lang="en-US" smtClean="0"/>
-              <a:t>8/12/20</a:t>
+              <a:t>8/14/20</a:t>
             </a:fld>
             <a:endParaRPr lang="en-US"/>
           </a:p>
@@ -1235,7 +1235,7 @@
           <a:p>
             <a:fld id="{819F1B0C-88C5-8743-A989-F2A2B2547689}" type="datetimeFigureOut">
               <a:rPr lang="en-US" smtClean="0"/>
-              <a:t>8/12/20</a:t>
+              <a:t>8/14/20</a:t>
             </a:fld>
             <a:endParaRPr lang="en-US"/>
           </a:p>
@@ -1435,7 +1435,7 @@
           <a:p>
             <a:fld id="{819F1B0C-88C5-8743-A989-F2A2B2547689}" type="datetimeFigureOut">
               <a:rPr lang="en-US" smtClean="0"/>
-              <a:t>8/12/20</a:t>
+              <a:t>8/14/20</a:t>
             </a:fld>
             <a:endParaRPr lang="en-US"/>
           </a:p>
@@ -1711,7 +1711,7 @@
           <a:p>
             <a:fld id="{819F1B0C-88C5-8743-A989-F2A2B2547689}" type="datetimeFigureOut">
               <a:rPr lang="en-US" smtClean="0"/>
-              <a:t>8/12/20</a:t>
+              <a:t>8/14/20</a:t>
             </a:fld>
             <a:endParaRPr lang="en-US"/>
           </a:p>
@@ -1979,7 +1979,7 @@
           <a:p>
             <a:fld id="{819F1B0C-88C5-8743-A989-F2A2B2547689}" type="datetimeFigureOut">
               <a:rPr lang="en-US" smtClean="0"/>
-              <a:t>8/12/20</a:t>
+              <a:t>8/14/20</a:t>
             </a:fld>
             <a:endParaRPr lang="en-US"/>
           </a:p>
@@ -2394,7 +2394,7 @@
           <a:p>
             <a:fld id="{819F1B0C-88C5-8743-A989-F2A2B2547689}" type="datetimeFigureOut">
               <a:rPr lang="en-US" smtClean="0"/>
-              <a:t>8/12/20</a:t>
+              <a:t>8/14/20</a:t>
             </a:fld>
             <a:endParaRPr lang="en-US"/>
           </a:p>
@@ -2536,7 +2536,7 @@
           <a:p>
             <a:fld id="{819F1B0C-88C5-8743-A989-F2A2B2547689}" type="datetimeFigureOut">
               <a:rPr lang="en-US" smtClean="0"/>
-              <a:t>8/12/20</a:t>
+              <a:t>8/14/20</a:t>
             </a:fld>
             <a:endParaRPr lang="en-US"/>
           </a:p>
@@ -2649,7 +2649,7 @@
           <a:p>
             <a:fld id="{819F1B0C-88C5-8743-A989-F2A2B2547689}" type="datetimeFigureOut">
               <a:rPr lang="en-US" smtClean="0"/>
-              <a:t>8/12/20</a:t>
+              <a:t>8/14/20</a:t>
             </a:fld>
             <a:endParaRPr lang="en-US"/>
           </a:p>
@@ -2962,7 +2962,7 @@
           <a:p>
             <a:fld id="{819F1B0C-88C5-8743-A989-F2A2B2547689}" type="datetimeFigureOut">
               <a:rPr lang="en-US" smtClean="0"/>
-              <a:t>8/12/20</a:t>
+              <a:t>8/14/20</a:t>
             </a:fld>
             <a:endParaRPr lang="en-US"/>
           </a:p>
@@ -3255,7 +3255,7 @@
           <a:p>
             <a:fld id="{819F1B0C-88C5-8743-A989-F2A2B2547689}" type="datetimeFigureOut">
               <a:rPr lang="en-US" smtClean="0"/>
-              <a:t>8/12/20</a:t>
+              <a:t>8/14/20</a:t>
             </a:fld>
             <a:endParaRPr lang="en-US"/>
           </a:p>
@@ -3498,7 +3498,7 @@
           <a:p>
             <a:fld id="{819F1B0C-88C5-8743-A989-F2A2B2547689}" type="datetimeFigureOut">
               <a:rPr lang="en-US" smtClean="0"/>
-              <a:t>8/12/20</a:t>
+              <a:t>8/14/20</a:t>
             </a:fld>
             <a:endParaRPr lang="en-US"/>
           </a:p>
@@ -5094,6 +5094,214 @@
           </a:p>
         </p:txBody>
       </p:sp>
+      <p:sp>
+        <p:nvSpPr>
+          <p:cNvPr id="8" name="Rectangle 7">
+            <a:extLst>
+              <a:ext uri="{FF2B5EF4-FFF2-40B4-BE49-F238E27FC236}">
+                <a16:creationId xmlns:a16="http://schemas.microsoft.com/office/drawing/2014/main" id="{F637B1DC-EFC7-9C43-B3BC-4B14A35D0ACC}"/>
+              </a:ext>
+            </a:extLst>
+          </p:cNvPr>
+          <p:cNvSpPr/>
+          <p:nvPr/>
+        </p:nvSpPr>
+        <p:spPr>
+          <a:xfrm>
+            <a:off x="10333778" y="5203371"/>
+            <a:ext cx="1205080" cy="231969"/>
+          </a:xfrm>
+          <a:prstGeom prst="rect">
+            <a:avLst/>
+          </a:prstGeom>
+          <a:solidFill>
+            <a:schemeClr val="accent2"/>
+          </a:solidFill>
+        </p:spPr>
+        <p:style>
+          <a:lnRef idx="2">
+            <a:schemeClr val="accent1">
+              <a:shade val="50000"/>
+            </a:schemeClr>
+          </a:lnRef>
+          <a:fillRef idx="1">
+            <a:schemeClr val="accent1"/>
+          </a:fillRef>
+          <a:effectRef idx="0">
+            <a:schemeClr val="accent1"/>
+          </a:effectRef>
+          <a:fontRef idx="minor">
+            <a:schemeClr val="lt1"/>
+          </a:fontRef>
+        </p:style>
+        <p:txBody>
+          <a:bodyPr rtlCol="0" anchor="ctr"/>
+          <a:lstStyle/>
+          <a:p>
+            <a:pPr algn="ctr"/>
+            <a:r>
+              <a:rPr lang="en-US" dirty="0"/>
+              <a:t>Operation</a:t>
+            </a:r>
+          </a:p>
+        </p:txBody>
+      </p:sp>
+      <p:sp>
+        <p:nvSpPr>
+          <p:cNvPr id="10" name="Rectangle 9">
+            <a:extLst>
+              <a:ext uri="{FF2B5EF4-FFF2-40B4-BE49-F238E27FC236}">
+                <a16:creationId xmlns:a16="http://schemas.microsoft.com/office/drawing/2014/main" id="{E47DCC4A-3EB2-D44E-8FD5-FDA00F587173}"/>
+              </a:ext>
+            </a:extLst>
+          </p:cNvPr>
+          <p:cNvSpPr/>
+          <p:nvPr/>
+        </p:nvSpPr>
+        <p:spPr>
+          <a:xfrm rot="5400000">
+            <a:off x="10525726" y="5691157"/>
+            <a:ext cx="821183" cy="309550"/>
+          </a:xfrm>
+          <a:prstGeom prst="rect">
+            <a:avLst/>
+          </a:prstGeom>
+          <a:solidFill>
+            <a:schemeClr val="accent2"/>
+          </a:solidFill>
+        </p:spPr>
+        <p:style>
+          <a:lnRef idx="2">
+            <a:schemeClr val="accent1">
+              <a:shade val="50000"/>
+            </a:schemeClr>
+          </a:lnRef>
+          <a:fillRef idx="1">
+            <a:schemeClr val="accent1"/>
+          </a:fillRef>
+          <a:effectRef idx="0">
+            <a:schemeClr val="accent1"/>
+          </a:effectRef>
+          <a:fontRef idx="minor">
+            <a:schemeClr val="lt1"/>
+          </a:fontRef>
+        </p:style>
+        <p:txBody>
+          <a:bodyPr rtlCol="0" anchor="ctr"/>
+          <a:lstStyle/>
+          <a:p>
+            <a:pPr algn="ctr"/>
+            <a:r>
+              <a:rPr lang="en-US" dirty="0"/>
+              <a:t>Result</a:t>
+            </a:r>
+          </a:p>
+        </p:txBody>
+      </p:sp>
+      <p:sp>
+        <p:nvSpPr>
+          <p:cNvPr id="11" name="Rectangle 10">
+            <a:extLst>
+              <a:ext uri="{FF2B5EF4-FFF2-40B4-BE49-F238E27FC236}">
+                <a16:creationId xmlns:a16="http://schemas.microsoft.com/office/drawing/2014/main" id="{ECFF3E16-7727-8546-8DAC-541A1F818D02}"/>
+              </a:ext>
+            </a:extLst>
+          </p:cNvPr>
+          <p:cNvSpPr/>
+          <p:nvPr/>
+        </p:nvSpPr>
+        <p:spPr>
+          <a:xfrm rot="5400000">
+            <a:off x="10826535" y="4491049"/>
+            <a:ext cx="1115094" cy="309551"/>
+          </a:xfrm>
+          <a:prstGeom prst="rect">
+            <a:avLst/>
+          </a:prstGeom>
+          <a:solidFill>
+            <a:schemeClr val="accent2"/>
+          </a:solidFill>
+        </p:spPr>
+        <p:style>
+          <a:lnRef idx="2">
+            <a:schemeClr val="accent1">
+              <a:shade val="50000"/>
+            </a:schemeClr>
+          </a:lnRef>
+          <a:fillRef idx="1">
+            <a:schemeClr val="accent1"/>
+          </a:fillRef>
+          <a:effectRef idx="0">
+            <a:schemeClr val="accent1"/>
+          </a:effectRef>
+          <a:fontRef idx="minor">
+            <a:schemeClr val="lt1"/>
+          </a:fontRef>
+        </p:style>
+        <p:txBody>
+          <a:bodyPr rtlCol="0" anchor="ctr"/>
+          <a:lstStyle/>
+          <a:p>
+            <a:pPr algn="ctr"/>
+            <a:r>
+              <a:rPr lang="en-US" dirty="0"/>
+              <a:t>Operands</a:t>
+            </a:r>
+          </a:p>
+        </p:txBody>
+      </p:sp>
+      <p:sp>
+        <p:nvSpPr>
+          <p:cNvPr id="12" name="Rectangle 11">
+            <a:extLst>
+              <a:ext uri="{FF2B5EF4-FFF2-40B4-BE49-F238E27FC236}">
+                <a16:creationId xmlns:a16="http://schemas.microsoft.com/office/drawing/2014/main" id="{7BF673C1-37BF-BF45-BEEC-660F8A42016E}"/>
+              </a:ext>
+            </a:extLst>
+          </p:cNvPr>
+          <p:cNvSpPr/>
+          <p:nvPr/>
+        </p:nvSpPr>
+        <p:spPr>
+          <a:xfrm rot="5400000">
+            <a:off x="9931006" y="4491049"/>
+            <a:ext cx="1115094" cy="309551"/>
+          </a:xfrm>
+          <a:prstGeom prst="rect">
+            <a:avLst/>
+          </a:prstGeom>
+          <a:solidFill>
+            <a:schemeClr val="accent2"/>
+          </a:solidFill>
+        </p:spPr>
+        <p:style>
+          <a:lnRef idx="2">
+            <a:schemeClr val="accent1">
+              <a:shade val="50000"/>
+            </a:schemeClr>
+          </a:lnRef>
+          <a:fillRef idx="1">
+            <a:schemeClr val="accent1"/>
+          </a:fillRef>
+          <a:effectRef idx="0">
+            <a:schemeClr val="accent1"/>
+          </a:effectRef>
+          <a:fontRef idx="minor">
+            <a:schemeClr val="lt1"/>
+          </a:fontRef>
+        </p:style>
+        <p:txBody>
+          <a:bodyPr rtlCol="0" anchor="ctr"/>
+          <a:lstStyle/>
+          <a:p>
+            <a:pPr algn="ctr"/>
+            <a:r>
+              <a:rPr lang="en-US" dirty="0"/>
+              <a:t>Operands</a:t>
+            </a:r>
+          </a:p>
+        </p:txBody>
+      </p:sp>
     </p:spTree>
     <p:extLst>
       <p:ext uri="{BB962C8B-B14F-4D97-AF65-F5344CB8AC3E}">
@@ -5274,6 +5482,150 @@
                       </p:childTnLst>
                     </p:cTn>
                   </p:par>
+                  <p:par>
+                    <p:cTn id="17" fill="hold">
+                      <p:stCondLst>
+                        <p:cond delay="indefinite"/>
+                      </p:stCondLst>
+                      <p:childTnLst>
+                        <p:par>
+                          <p:cTn id="18" fill="hold">
+                            <p:stCondLst>
+                              <p:cond delay="0"/>
+                            </p:stCondLst>
+                            <p:childTnLst>
+                              <p:par>
+                                <p:cTn id="19" presetID="1" presetClass="entr" presetSubtype="0" fill="hold" grpId="0" nodeType="clickEffect">
+                                  <p:stCondLst>
+                                    <p:cond delay="0"/>
+                                  </p:stCondLst>
+                                  <p:childTnLst>
+                                    <p:set>
+                                      <p:cBhvr>
+                                        <p:cTn id="20" dur="1" fill="hold">
+                                          <p:stCondLst>
+                                            <p:cond delay="0"/>
+                                          </p:stCondLst>
+                                        </p:cTn>
+                                        <p:tgtEl>
+                                          <p:spTgt spid="8"/>
+                                        </p:tgtEl>
+                                        <p:attrNameLst>
+                                          <p:attrName>style.visibility</p:attrName>
+                                        </p:attrNameLst>
+                                      </p:cBhvr>
+                                      <p:to>
+                                        <p:strVal val="visible"/>
+                                      </p:to>
+                                    </p:set>
+                                  </p:childTnLst>
+                                </p:cTn>
+                              </p:par>
+                              <p:par>
+                                <p:cTn id="21" presetID="1" presetClass="entr" presetSubtype="0" fill="hold" grpId="0" nodeType="withEffect">
+                                  <p:stCondLst>
+                                    <p:cond delay="0"/>
+                                  </p:stCondLst>
+                                  <p:childTnLst>
+                                    <p:set>
+                                      <p:cBhvr>
+                                        <p:cTn id="22" dur="1" fill="hold">
+                                          <p:stCondLst>
+                                            <p:cond delay="0"/>
+                                          </p:stCondLst>
+                                        </p:cTn>
+                                        <p:tgtEl>
+                                          <p:spTgt spid="11"/>
+                                        </p:tgtEl>
+                                        <p:attrNameLst>
+                                          <p:attrName>style.visibility</p:attrName>
+                                        </p:attrNameLst>
+                                      </p:cBhvr>
+                                      <p:to>
+                                        <p:strVal val="visible"/>
+                                      </p:to>
+                                    </p:set>
+                                  </p:childTnLst>
+                                </p:cTn>
+                              </p:par>
+                            </p:childTnLst>
+                          </p:cTn>
+                        </p:par>
+                      </p:childTnLst>
+                    </p:cTn>
+                  </p:par>
+                  <p:par>
+                    <p:cTn id="23" fill="hold">
+                      <p:stCondLst>
+                        <p:cond delay="indefinite"/>
+                      </p:stCondLst>
+                      <p:childTnLst>
+                        <p:par>
+                          <p:cTn id="24" fill="hold">
+                            <p:stCondLst>
+                              <p:cond delay="0"/>
+                            </p:stCondLst>
+                            <p:childTnLst>
+                              <p:par>
+                                <p:cTn id="25" presetID="1" presetClass="entr" presetSubtype="0" fill="hold" grpId="0" nodeType="clickEffect">
+                                  <p:stCondLst>
+                                    <p:cond delay="0"/>
+                                  </p:stCondLst>
+                                  <p:childTnLst>
+                                    <p:set>
+                                      <p:cBhvr>
+                                        <p:cTn id="26" dur="1" fill="hold">
+                                          <p:stCondLst>
+                                            <p:cond delay="0"/>
+                                          </p:stCondLst>
+                                        </p:cTn>
+                                        <p:tgtEl>
+                                          <p:spTgt spid="10"/>
+                                        </p:tgtEl>
+                                        <p:attrNameLst>
+                                          <p:attrName>style.visibility</p:attrName>
+                                        </p:attrNameLst>
+                                      </p:cBhvr>
+                                      <p:to>
+                                        <p:strVal val="visible"/>
+                                      </p:to>
+                                    </p:set>
+                                  </p:childTnLst>
+                                </p:cTn>
+                              </p:par>
+                              <p:par>
+                                <p:cTn id="27" presetID="1" presetClass="entr" presetSubtype="0" fill="hold" grpId="0" nodeType="withEffect">
+                                  <p:stCondLst>
+                                    <p:cond delay="0"/>
+                                  </p:stCondLst>
+                                  <p:childTnLst>
+                                    <p:set>
+                                      <p:cBhvr>
+                                        <p:cTn id="28" dur="1" fill="hold">
+                                          <p:stCondLst>
+                                            <p:cond delay="0"/>
+                                          </p:stCondLst>
+                                        </p:cTn>
+                                        <p:tgtEl>
+                                          <p:spTgt spid="12"/>
+                                        </p:tgtEl>
+                                        <p:attrNameLst>
+                                          <p:attrName>style.visibility</p:attrName>
+                                        </p:attrNameLst>
+                                      </p:cBhvr>
+                                      <p:to>
+                                        <p:strVal val="visible"/>
+                                      </p:to>
+                                    </p:set>
+                                  </p:childTnLst>
+                                </p:cTn>
+                              </p:par>
+                            </p:childTnLst>
+                          </p:cTn>
+                        </p:par>
+                      </p:childTnLst>
+                    </p:cTn>
+                  </p:par>
                 </p:childTnLst>
               </p:cTn>
               <p:prevCondLst>
@@ -5300,6 +5652,10 @@
       <p:bldP spid="5" grpId="0" animBg="1"/>
       <p:bldP spid="6" grpId="0" animBg="1"/>
       <p:bldP spid="7" grpId="0" animBg="1"/>
+      <p:bldP spid="8" grpId="0" animBg="1"/>
+      <p:bldP spid="10" grpId="0" animBg="1"/>
+      <p:bldP spid="11" grpId="0" animBg="1"/>
+      <p:bldP spid="12" grpId="0" animBg="1"/>
     </p:bldLst>
   </p:timing>
 </p:sld>
@@ -5844,61 +6200,112 @@
       </p:grpSpPr>
       <p:sp>
         <p:nvSpPr>
-          <p:cNvPr id="4" name="Title 3">
-            <a:extLst>
-              <a:ext uri="{FF2B5EF4-FFF2-40B4-BE49-F238E27FC236}">
-                <a16:creationId xmlns:a16="http://schemas.microsoft.com/office/drawing/2014/main" id="{285BBC97-09A3-B54D-9F61-7398BB141655}"/>
-              </a:ext>
-            </a:extLst>
-          </p:cNvPr>
-          <p:cNvSpPr>
-            <a:spLocks noGrp="1"/>
-          </p:cNvSpPr>
-          <p:nvPr>
-            <p:ph type="ctrTitle"/>
-          </p:nvPr>
-        </p:nvSpPr>
-        <p:spPr/>
-        <p:txBody>
-          <a:bodyPr/>
+          <p:cNvPr id="4" name="Rectangle 3">
+            <a:extLst>
+              <a:ext uri="{FF2B5EF4-FFF2-40B4-BE49-F238E27FC236}">
+                <a16:creationId xmlns:a16="http://schemas.microsoft.com/office/drawing/2014/main" id="{53F11135-F4EB-5A46-A1C7-72AA1BAD980B}"/>
+              </a:ext>
+            </a:extLst>
+          </p:cNvPr>
+          <p:cNvSpPr/>
+          <p:nvPr/>
+        </p:nvSpPr>
+        <p:spPr>
+          <a:xfrm rot="2482649">
+            <a:off x="5620113" y="2471400"/>
+            <a:ext cx="4048298" cy="532015"/>
+          </a:xfrm>
+          <a:prstGeom prst="rect">
+            <a:avLst/>
+          </a:prstGeom>
+          <a:solidFill>
+            <a:schemeClr val="accent2"/>
+          </a:solidFill>
+        </p:spPr>
+        <p:style>
+          <a:lnRef idx="2">
+            <a:schemeClr val="accent1">
+              <a:shade val="50000"/>
+            </a:schemeClr>
+          </a:lnRef>
+          <a:fillRef idx="1">
+            <a:schemeClr val="accent1"/>
+          </a:fillRef>
+          <a:effectRef idx="0">
+            <a:schemeClr val="accent1"/>
+          </a:effectRef>
+          <a:fontRef idx="minor">
+            <a:schemeClr val="lt1"/>
+          </a:fontRef>
+        </p:style>
+        <p:txBody>
+          <a:bodyPr rtlCol="0" anchor="ctr"/>
           <a:lstStyle/>
           <a:p>
+            <a:pPr algn="ctr"/>
             <a:r>
               <a:rPr lang="en-US" dirty="0"/>
-              <a:t>Backup</a:t>
-            </a:r>
-          </a:p>
-        </p:txBody>
-      </p:sp>
-      <p:sp>
-        <p:nvSpPr>
-          <p:cNvPr id="5" name="Subtitle 4">
-            <a:extLst>
-              <a:ext uri="{FF2B5EF4-FFF2-40B4-BE49-F238E27FC236}">
-                <a16:creationId xmlns:a16="http://schemas.microsoft.com/office/drawing/2014/main" id="{591A02C1-40D9-3B4C-B688-DF75EB251795}"/>
-              </a:ext>
-            </a:extLst>
-          </p:cNvPr>
-          <p:cNvSpPr>
-            <a:spLocks noGrp="1"/>
-          </p:cNvSpPr>
-          <p:nvPr>
-            <p:ph type="subTitle" idx="1"/>
-          </p:nvPr>
-        </p:nvSpPr>
-        <p:spPr/>
-        <p:txBody>
-          <a:bodyPr/>
+              <a:t>Typing</a:t>
+            </a:r>
+          </a:p>
+        </p:txBody>
+      </p:sp>
+      <p:sp>
+        <p:nvSpPr>
+          <p:cNvPr id="5" name="Rectangle 4">
+            <a:extLst>
+              <a:ext uri="{FF2B5EF4-FFF2-40B4-BE49-F238E27FC236}">
+                <a16:creationId xmlns:a16="http://schemas.microsoft.com/office/drawing/2014/main" id="{4D38A7A8-ABAB-E54A-B9E2-219292D98A68}"/>
+              </a:ext>
+            </a:extLst>
+          </p:cNvPr>
+          <p:cNvSpPr/>
+          <p:nvPr/>
+        </p:nvSpPr>
+        <p:spPr>
+          <a:xfrm rot="18682649">
+            <a:off x="2769325" y="2314303"/>
+            <a:ext cx="4048298" cy="532015"/>
+          </a:xfrm>
+          <a:prstGeom prst="rect">
+            <a:avLst/>
+          </a:prstGeom>
+          <a:solidFill>
+            <a:schemeClr val="accent2"/>
+          </a:solidFill>
+        </p:spPr>
+        <p:style>
+          <a:lnRef idx="2">
+            <a:schemeClr val="accent1">
+              <a:shade val="50000"/>
+            </a:schemeClr>
+          </a:lnRef>
+          <a:fillRef idx="1">
+            <a:schemeClr val="accent1"/>
+          </a:fillRef>
+          <a:effectRef idx="0">
+            <a:schemeClr val="accent1"/>
+          </a:effectRef>
+          <a:fontRef idx="minor">
+            <a:schemeClr val="lt1"/>
+          </a:fontRef>
+        </p:style>
+        <p:txBody>
+          <a:bodyPr rtlCol="0" anchor="ctr"/>
           <a:lstStyle/>
           <a:p>
-            <a:endParaRPr lang="en-US"/>
+            <a:pPr algn="ctr"/>
+            <a:r>
+              <a:rPr lang="en-US" dirty="0"/>
+              <a:t>Duck</a:t>
+            </a:r>
           </a:p>
         </p:txBody>
       </p:sp>
     </p:spTree>
     <p:extLst>
       <p:ext uri="{BB962C8B-B14F-4D97-AF65-F5344CB8AC3E}">
-        <p14:creationId xmlns:p14="http://schemas.microsoft.com/office/powerpoint/2010/main" val="3398957329"/>
+        <p14:creationId xmlns:p14="http://schemas.microsoft.com/office/powerpoint/2010/main" val="4091274290"/>
       </p:ext>
     </p:extLst>
   </p:cSld>
@@ -5927,27 +6334,32 @@
       </p:grpSpPr>
       <p:sp>
         <p:nvSpPr>
-          <p:cNvPr id="5" name="Rectangle 4">
-            <a:extLst>
-              <a:ext uri="{FF2B5EF4-FFF2-40B4-BE49-F238E27FC236}">
-                <a16:creationId xmlns:a16="http://schemas.microsoft.com/office/drawing/2014/main" id="{A7A0E572-73CB-D042-80A7-76703A3B33DA}"/>
-              </a:ext>
-            </a:extLst>
-          </p:cNvPr>
-          <p:cNvSpPr/>
+          <p:cNvPr id="7" name="&quot;No&quot; Symbol 6">
+            <a:extLst>
+              <a:ext uri="{FF2B5EF4-FFF2-40B4-BE49-F238E27FC236}">
+                <a16:creationId xmlns:a16="http://schemas.microsoft.com/office/drawing/2014/main" id="{FA0633E5-9C27-9842-8B2D-F06F68749FEC}"/>
+              </a:ext>
+            </a:extLst>
+          </p:cNvPr>
+          <p:cNvSpPr>
+            <a:spLocks/>
+          </p:cNvSpPr>
           <p:nvPr/>
         </p:nvSpPr>
         <p:spPr>
           <a:xfrm>
-            <a:off x="2834640" y="1305098"/>
-            <a:ext cx="4048298" cy="532015"/>
+            <a:off x="2797629" y="762000"/>
+            <a:ext cx="6433200" cy="5334000"/>
           </a:xfrm>
-          <a:prstGeom prst="rect">
-            <a:avLst/>
+          <a:prstGeom prst="noSmoking">
+            <a:avLst>
+              <a:gd name="adj" fmla="val 1165"/>
+            </a:avLst>
           </a:prstGeom>
           <a:solidFill>
             <a:schemeClr val="accent2"/>
           </a:solidFill>
+          <a:ln w="12700"/>
         </p:spPr>
         <p:style>
           <a:lnRef idx="2">
@@ -5970,458 +6382,59 @@
           <a:lstStyle/>
           <a:p>
             <a:pPr algn="ctr"/>
-            <a:endParaRPr lang="en-US"/>
-          </a:p>
-        </p:txBody>
-      </p:sp>
-      <p:sp>
-        <p:nvSpPr>
-          <p:cNvPr id="6" name="Rectangle 5">
-            <a:extLst>
-              <a:ext uri="{FF2B5EF4-FFF2-40B4-BE49-F238E27FC236}">
-                <a16:creationId xmlns:a16="http://schemas.microsoft.com/office/drawing/2014/main" id="{0488C725-FC2E-2343-88A2-55FAD91694A8}"/>
-              </a:ext>
-            </a:extLst>
-          </p:cNvPr>
-          <p:cNvSpPr/>
+            <a:endParaRPr lang="en-US">
+              <a:solidFill>
+                <a:schemeClr val="tx1"/>
+              </a:solidFill>
+            </a:endParaRPr>
+          </a:p>
+        </p:txBody>
+      </p:sp>
+      <p:sp>
+        <p:nvSpPr>
+          <p:cNvPr id="8" name="TextBox 7">
+            <a:extLst>
+              <a:ext uri="{FF2B5EF4-FFF2-40B4-BE49-F238E27FC236}">
+                <a16:creationId xmlns:a16="http://schemas.microsoft.com/office/drawing/2014/main" id="{ED5658AE-2ED4-6D47-B086-619CDE436B89}"/>
+              </a:ext>
+            </a:extLst>
+          </p:cNvPr>
+          <p:cNvSpPr txBox="1"/>
           <p:nvPr/>
         </p:nvSpPr>
         <p:spPr>
-          <a:xfrm rot="5400000">
-            <a:off x="6899565" y="3063240"/>
-            <a:ext cx="4048298" cy="532015"/>
+          <a:xfrm rot="2385011">
+            <a:off x="5369122" y="2641922"/>
+            <a:ext cx="1816716" cy="584775"/>
           </a:xfrm>
           <a:prstGeom prst="rect">
             <a:avLst/>
           </a:prstGeom>
-          <a:solidFill>
-            <a:schemeClr val="accent2"/>
-          </a:solidFill>
+          <a:noFill/>
         </p:spPr>
-        <p:style>
-          <a:lnRef idx="2">
-            <a:schemeClr val="accent1">
-              <a:shade val="50000"/>
-            </a:schemeClr>
-          </a:lnRef>
-          <a:fillRef idx="1">
-            <a:schemeClr val="accent1"/>
-          </a:fillRef>
-          <a:effectRef idx="0">
-            <a:schemeClr val="accent1"/>
-          </a:effectRef>
-          <a:fontRef idx="minor">
-            <a:schemeClr val="lt1"/>
-          </a:fontRef>
-        </p:style>
-        <p:txBody>
-          <a:bodyPr rtlCol="0" anchor="ctr"/>
+        <p:txBody>
+          <a:bodyPr wrap="none" rtlCol="0">
+            <a:spAutoFit/>
+          </a:bodyPr>
           <a:lstStyle/>
           <a:p>
-            <a:pPr algn="ctr"/>
-            <a:endParaRPr lang="en-US"/>
-          </a:p>
-        </p:txBody>
-      </p:sp>
-      <p:sp>
-        <p:nvSpPr>
-          <p:cNvPr id="7" name="Rectangle 6">
-            <a:extLst>
-              <a:ext uri="{FF2B5EF4-FFF2-40B4-BE49-F238E27FC236}">
-                <a16:creationId xmlns:a16="http://schemas.microsoft.com/office/drawing/2014/main" id="{5BD9700C-319E-3542-B378-91C9E5F5FA2D}"/>
-              </a:ext>
-            </a:extLst>
-          </p:cNvPr>
-          <p:cNvSpPr/>
-          <p:nvPr/>
-        </p:nvSpPr>
-        <p:spPr>
-          <a:xfrm rot="5400000">
-            <a:off x="5124796" y="4105102"/>
-            <a:ext cx="4048298" cy="532015"/>
-          </a:xfrm>
-          <a:prstGeom prst="rect">
-            <a:avLst/>
-          </a:prstGeom>
-          <a:solidFill>
-            <a:schemeClr val="accent2"/>
-          </a:solidFill>
-        </p:spPr>
-        <p:style>
-          <a:lnRef idx="2">
-            <a:schemeClr val="accent1">
-              <a:shade val="50000"/>
-            </a:schemeClr>
-          </a:lnRef>
-          <a:fillRef idx="1">
-            <a:schemeClr val="accent1"/>
-          </a:fillRef>
-          <a:effectRef idx="0">
-            <a:schemeClr val="accent1"/>
-          </a:effectRef>
-          <a:fontRef idx="minor">
-            <a:schemeClr val="lt1"/>
-          </a:fontRef>
-        </p:style>
-        <p:txBody>
-          <a:bodyPr rtlCol="0" anchor="ctr"/>
-          <a:lstStyle/>
-          <a:p>
-            <a:pPr algn="ctr"/>
-            <a:endParaRPr lang="en-US"/>
-          </a:p>
-        </p:txBody>
-      </p:sp>
-      <p:sp>
-        <p:nvSpPr>
-          <p:cNvPr id="8" name="Rectangle 7">
-            <a:extLst>
-              <a:ext uri="{FF2B5EF4-FFF2-40B4-BE49-F238E27FC236}">
-                <a16:creationId xmlns:a16="http://schemas.microsoft.com/office/drawing/2014/main" id="{BC4E7B9D-1DE2-334D-BD7F-84EBA445AE7B}"/>
-              </a:ext>
-            </a:extLst>
-          </p:cNvPr>
-          <p:cNvSpPr/>
-          <p:nvPr/>
-        </p:nvSpPr>
-        <p:spPr>
-          <a:xfrm>
-            <a:off x="2834640" y="2346960"/>
-            <a:ext cx="4048298" cy="532015"/>
-          </a:xfrm>
-          <a:prstGeom prst="rect">
-            <a:avLst/>
-          </a:prstGeom>
-          <a:solidFill>
-            <a:schemeClr val="accent2"/>
-          </a:solidFill>
-        </p:spPr>
-        <p:style>
-          <a:lnRef idx="2">
-            <a:schemeClr val="accent1">
-              <a:shade val="50000"/>
-            </a:schemeClr>
-          </a:lnRef>
-          <a:fillRef idx="1">
-            <a:schemeClr val="accent1"/>
-          </a:fillRef>
-          <a:effectRef idx="0">
-            <a:schemeClr val="accent1"/>
-          </a:effectRef>
-          <a:fontRef idx="minor">
-            <a:schemeClr val="lt1"/>
-          </a:fontRef>
-        </p:style>
-        <p:txBody>
-          <a:bodyPr rtlCol="0" anchor="ctr"/>
-          <a:lstStyle/>
-          <a:p>
-            <a:pPr algn="ctr"/>
-            <a:endParaRPr lang="en-US" dirty="0"/>
-          </a:p>
-        </p:txBody>
-      </p:sp>
-      <p:sp>
-        <p:nvSpPr>
-          <p:cNvPr id="9" name="Rectangle 8">
-            <a:extLst>
-              <a:ext uri="{FF2B5EF4-FFF2-40B4-BE49-F238E27FC236}">
-                <a16:creationId xmlns:a16="http://schemas.microsoft.com/office/drawing/2014/main" id="{FE19B853-0E29-9F44-AD6D-20AE9DD2BC1C}"/>
-              </a:ext>
-            </a:extLst>
-          </p:cNvPr>
-          <p:cNvSpPr/>
-          <p:nvPr/>
-        </p:nvSpPr>
-        <p:spPr>
-          <a:xfrm rot="5400000">
-            <a:off x="-926871" y="3363051"/>
-            <a:ext cx="4048298" cy="532015"/>
-          </a:xfrm>
-          <a:prstGeom prst="rect">
-            <a:avLst/>
-          </a:prstGeom>
-          <a:solidFill>
-            <a:schemeClr val="accent2"/>
-          </a:solidFill>
-        </p:spPr>
-        <p:style>
-          <a:lnRef idx="2">
-            <a:schemeClr val="accent1">
-              <a:shade val="50000"/>
-            </a:schemeClr>
-          </a:lnRef>
-          <a:fillRef idx="1">
-            <a:schemeClr val="accent1"/>
-          </a:fillRef>
-          <a:effectRef idx="0">
-            <a:schemeClr val="accent1"/>
-          </a:effectRef>
-          <a:fontRef idx="minor">
-            <a:schemeClr val="lt1"/>
-          </a:fontRef>
-        </p:style>
-        <p:txBody>
-          <a:bodyPr rtlCol="0" anchor="ctr"/>
-          <a:lstStyle/>
-          <a:p>
-            <a:pPr algn="ctr"/>
-            <a:endParaRPr lang="en-US"/>
-          </a:p>
-        </p:txBody>
-      </p:sp>
-      <p:sp>
-        <p:nvSpPr>
-          <p:cNvPr id="10" name="Rectangle 9">
-            <a:extLst>
-              <a:ext uri="{FF2B5EF4-FFF2-40B4-BE49-F238E27FC236}">
-                <a16:creationId xmlns:a16="http://schemas.microsoft.com/office/drawing/2014/main" id="{A6F172BE-CA1D-2A49-A1FC-AF188EE03A14}"/>
-              </a:ext>
-            </a:extLst>
-          </p:cNvPr>
-          <p:cNvSpPr/>
-          <p:nvPr/>
-        </p:nvSpPr>
-        <p:spPr>
-          <a:xfrm>
-            <a:off x="831270" y="5653208"/>
-            <a:ext cx="4048298" cy="532015"/>
-          </a:xfrm>
-          <a:prstGeom prst="rect">
-            <a:avLst/>
-          </a:prstGeom>
-          <a:solidFill>
-            <a:schemeClr val="accent2"/>
-          </a:solidFill>
-        </p:spPr>
-        <p:style>
-          <a:lnRef idx="2">
-            <a:schemeClr val="accent1">
-              <a:shade val="50000"/>
-            </a:schemeClr>
-          </a:lnRef>
-          <a:fillRef idx="1">
-            <a:schemeClr val="accent1"/>
-          </a:fillRef>
-          <a:effectRef idx="0">
-            <a:schemeClr val="accent1"/>
-          </a:effectRef>
-          <a:fontRef idx="minor">
-            <a:schemeClr val="lt1"/>
-          </a:fontRef>
-        </p:style>
-        <p:txBody>
-          <a:bodyPr rtlCol="0" anchor="ctr"/>
-          <a:lstStyle/>
-          <a:p>
-            <a:pPr algn="ctr"/>
-            <a:endParaRPr lang="en-US"/>
-          </a:p>
-        </p:txBody>
-      </p:sp>
-      <p:sp>
-        <p:nvSpPr>
-          <p:cNvPr id="11" name="Rectangle 10">
-            <a:extLst>
-              <a:ext uri="{FF2B5EF4-FFF2-40B4-BE49-F238E27FC236}">
-                <a16:creationId xmlns:a16="http://schemas.microsoft.com/office/drawing/2014/main" id="{B61ED613-9B6E-1B41-9EFE-CB011FD710D6}"/>
-              </a:ext>
-            </a:extLst>
-          </p:cNvPr>
-          <p:cNvSpPr/>
-          <p:nvPr/>
-        </p:nvSpPr>
-        <p:spPr>
-          <a:xfrm rot="5400000">
-            <a:off x="8042564" y="3573087"/>
-            <a:ext cx="4048298" cy="532015"/>
-          </a:xfrm>
-          <a:prstGeom prst="rect">
-            <a:avLst/>
-          </a:prstGeom>
-          <a:solidFill>
-            <a:schemeClr val="accent2"/>
-          </a:solidFill>
-        </p:spPr>
-        <p:style>
-          <a:lnRef idx="2">
-            <a:schemeClr val="accent1">
-              <a:shade val="50000"/>
-            </a:schemeClr>
-          </a:lnRef>
-          <a:fillRef idx="1">
-            <a:schemeClr val="accent1"/>
-          </a:fillRef>
-          <a:effectRef idx="0">
-            <a:schemeClr val="accent1"/>
-          </a:effectRef>
-          <a:fontRef idx="minor">
-            <a:schemeClr val="lt1"/>
-          </a:fontRef>
-        </p:style>
-        <p:txBody>
-          <a:bodyPr rtlCol="0" anchor="ctr"/>
-          <a:lstStyle/>
-          <a:p>
-            <a:pPr algn="ctr"/>
-            <a:endParaRPr lang="en-US" dirty="0"/>
-          </a:p>
-        </p:txBody>
-      </p:sp>
-      <p:sp>
-        <p:nvSpPr>
-          <p:cNvPr id="12" name="Rectangle 11">
-            <a:extLst>
-              <a:ext uri="{FF2B5EF4-FFF2-40B4-BE49-F238E27FC236}">
-                <a16:creationId xmlns:a16="http://schemas.microsoft.com/office/drawing/2014/main" id="{BA81DC10-20CC-0348-97D8-843097F5471B}"/>
-              </a:ext>
-            </a:extLst>
-          </p:cNvPr>
-          <p:cNvSpPr/>
-          <p:nvPr/>
-        </p:nvSpPr>
-        <p:spPr>
-          <a:xfrm>
-            <a:off x="8042565" y="5863244"/>
-            <a:ext cx="4048298" cy="532015"/>
-          </a:xfrm>
-          <a:prstGeom prst="rect">
-            <a:avLst/>
-          </a:prstGeom>
-          <a:solidFill>
-            <a:schemeClr val="accent2"/>
-          </a:solidFill>
-        </p:spPr>
-        <p:style>
-          <a:lnRef idx="2">
-            <a:schemeClr val="accent1">
-              <a:shade val="50000"/>
-            </a:schemeClr>
-          </a:lnRef>
-          <a:fillRef idx="1">
-            <a:schemeClr val="accent1"/>
-          </a:fillRef>
-          <a:effectRef idx="0">
-            <a:schemeClr val="accent1"/>
-          </a:effectRef>
-          <a:fontRef idx="minor">
-            <a:schemeClr val="lt1"/>
-          </a:fontRef>
-        </p:style>
-        <p:txBody>
-          <a:bodyPr rtlCol="0" anchor="ctr"/>
-          <a:lstStyle/>
-          <a:p>
-            <a:pPr algn="ctr"/>
-            <a:r>
-              <a:rPr lang="en-US" dirty="0"/>
-              <a:t>       </a:t>
-            </a:r>
-          </a:p>
-        </p:txBody>
-      </p:sp>
-      <p:sp>
-        <p:nvSpPr>
-          <p:cNvPr id="13" name="Rectangle 12">
-            <a:extLst>
-              <a:ext uri="{FF2B5EF4-FFF2-40B4-BE49-F238E27FC236}">
-                <a16:creationId xmlns:a16="http://schemas.microsoft.com/office/drawing/2014/main" id="{61E793E4-4667-8A4F-8063-7F0C18CE8A45}"/>
-              </a:ext>
-            </a:extLst>
-          </p:cNvPr>
-          <p:cNvSpPr/>
-          <p:nvPr/>
-        </p:nvSpPr>
-        <p:spPr>
-          <a:xfrm rot="10800000">
-            <a:off x="5935286" y="164037"/>
-            <a:ext cx="4048298" cy="532015"/>
-          </a:xfrm>
-          <a:prstGeom prst="rect">
-            <a:avLst/>
-          </a:prstGeom>
-          <a:solidFill>
-            <a:schemeClr val="accent2"/>
-          </a:solidFill>
-        </p:spPr>
-        <p:style>
-          <a:lnRef idx="2">
-            <a:schemeClr val="accent1">
-              <a:shade val="50000"/>
-            </a:schemeClr>
-          </a:lnRef>
-          <a:fillRef idx="1">
-            <a:schemeClr val="accent1"/>
-          </a:fillRef>
-          <a:effectRef idx="0">
-            <a:schemeClr val="accent1"/>
-          </a:effectRef>
-          <a:fontRef idx="minor">
-            <a:schemeClr val="lt1"/>
-          </a:fontRef>
-        </p:style>
-        <p:txBody>
-          <a:bodyPr rtlCol="0" anchor="ctr"/>
-          <a:lstStyle/>
-          <a:p>
-            <a:pPr algn="ctr"/>
-            <a:endParaRPr lang="en-US"/>
-          </a:p>
-        </p:txBody>
-      </p:sp>
-      <p:sp>
-        <p:nvSpPr>
-          <p:cNvPr id="14" name="Rectangle 13">
-            <a:extLst>
-              <a:ext uri="{FF2B5EF4-FFF2-40B4-BE49-F238E27FC236}">
-                <a16:creationId xmlns:a16="http://schemas.microsoft.com/office/drawing/2014/main" id="{0EE89CAD-B3F1-A949-BE03-C8F07A910910}"/>
-              </a:ext>
-            </a:extLst>
-          </p:cNvPr>
-          <p:cNvSpPr/>
-          <p:nvPr/>
-        </p:nvSpPr>
-        <p:spPr>
-          <a:xfrm rot="5400000">
-            <a:off x="6012180" y="2454195"/>
-            <a:ext cx="4048298" cy="532015"/>
-          </a:xfrm>
-          <a:prstGeom prst="rect">
-            <a:avLst/>
-          </a:prstGeom>
-          <a:solidFill>
-            <a:schemeClr val="accent2"/>
-          </a:solidFill>
-        </p:spPr>
-        <p:style>
-          <a:lnRef idx="2">
-            <a:schemeClr val="accent1">
-              <a:shade val="50000"/>
-            </a:schemeClr>
-          </a:lnRef>
-          <a:fillRef idx="1">
-            <a:schemeClr val="accent1"/>
-          </a:fillRef>
-          <a:effectRef idx="0">
-            <a:schemeClr val="accent1"/>
-          </a:effectRef>
-          <a:fontRef idx="minor">
-            <a:schemeClr val="lt1"/>
-          </a:fontRef>
-        </p:style>
-        <p:txBody>
-          <a:bodyPr rtlCol="0" anchor="ctr"/>
-          <a:lstStyle/>
-          <a:p>
-            <a:pPr algn="ctr"/>
-            <a:endParaRPr lang="en-US"/>
+            <a:r>
+              <a:rPr lang="en-US" sz="3200" dirty="0">
+                <a:solidFill>
+                  <a:schemeClr val="tx2">
+                    <a:lumMod val="75000"/>
+                  </a:schemeClr>
+                </a:solidFill>
+              </a:rPr>
+              <a:t>Recursion</a:t>
+            </a:r>
           </a:p>
         </p:txBody>
       </p:sp>
     </p:spTree>
     <p:extLst>
       <p:ext uri="{BB962C8B-B14F-4D97-AF65-F5344CB8AC3E}">
-        <p14:creationId xmlns:p14="http://schemas.microsoft.com/office/powerpoint/2010/main" val="1485724773"/>
+        <p14:creationId xmlns:p14="http://schemas.microsoft.com/office/powerpoint/2010/main" val="3436156904"/>
       </p:ext>
     </p:extLst>
   </p:cSld>

</xml_diff>